<commit_message>
updated day 1 presentation
</commit_message>
<xml_diff>
--- a/doc/BCB_Intro_Raster_2021.pptx
+++ b/doc/BCB_Intro_Raster_2021.pptx
@@ -6,7 +6,7 @@
     <p:sldMasterId id="2147483654" r:id="rId2"/>
   </p:sldMasterIdLst>
   <p:notesMasterIdLst>
-    <p:notesMasterId r:id="rId21"/>
+    <p:notesMasterId r:id="rId22"/>
   </p:notesMasterIdLst>
   <p:sldIdLst>
     <p:sldId id="335" r:id="rId3"/>
@@ -15,18 +15,19 @@
     <p:sldId id="413" r:id="rId6"/>
     <p:sldId id="438" r:id="rId7"/>
     <p:sldId id="439" r:id="rId8"/>
-    <p:sldId id="417" r:id="rId9"/>
-    <p:sldId id="418" r:id="rId10"/>
-    <p:sldId id="419" r:id="rId11"/>
-    <p:sldId id="420" r:id="rId12"/>
-    <p:sldId id="422" r:id="rId13"/>
-    <p:sldId id="423" r:id="rId14"/>
-    <p:sldId id="421" r:id="rId15"/>
-    <p:sldId id="424" r:id="rId16"/>
-    <p:sldId id="431" r:id="rId17"/>
-    <p:sldId id="432" r:id="rId18"/>
-    <p:sldId id="433" r:id="rId19"/>
-    <p:sldId id="434" r:id="rId20"/>
+    <p:sldId id="440" r:id="rId9"/>
+    <p:sldId id="417" r:id="rId10"/>
+    <p:sldId id="418" r:id="rId11"/>
+    <p:sldId id="419" r:id="rId12"/>
+    <p:sldId id="420" r:id="rId13"/>
+    <p:sldId id="422" r:id="rId14"/>
+    <p:sldId id="423" r:id="rId15"/>
+    <p:sldId id="421" r:id="rId16"/>
+    <p:sldId id="424" r:id="rId17"/>
+    <p:sldId id="431" r:id="rId18"/>
+    <p:sldId id="432" r:id="rId19"/>
+    <p:sldId id="433" r:id="rId20"/>
+    <p:sldId id="434" r:id="rId21"/>
   </p:sldIdLst>
   <p:sldSz cx="9144000" cy="5143500" type="screen16x9"/>
   <p:notesSz cx="6858000" cy="9144000"/>
@@ -236,7 +237,7 @@
           <a:p>
             <a:fld id="{8B3D4395-F4BB-4776-AD1A-E1F7520CF444}" type="datetimeFigureOut">
               <a:rPr lang="en-US" smtClean="0"/>
-              <a:t>4/16/21</a:t>
+              <a:t>4/20/21</a:t>
             </a:fld>
             <a:endParaRPr lang="en-US" dirty="0"/>
           </a:p>
@@ -2719,7 +2720,7 @@
           <p:cNvPr id="2" name="Title 1">
             <a:extLst>
               <a:ext uri="{FF2B5EF4-FFF2-40B4-BE49-F238E27FC236}">
-                <a16:creationId xmlns:a16="http://schemas.microsoft.com/office/drawing/2014/main" id="{AD43E6D5-2C05-214D-95B2-C269788BB384}"/>
+                <a16:creationId xmlns:a16="http://schemas.microsoft.com/office/drawing/2014/main" id="{F09CD2E8-75D0-4A48-AC4A-0C5A28DE906A}"/>
               </a:ext>
             </a:extLst>
           </p:cNvPr>
@@ -2737,17 +2738,96 @@
           <a:p>
             <a:r>
               <a:rPr lang="en-US" dirty="0"/>
-              <a:t>Continuous vs categorical</a:t>
+              <a:t>Introduction to Raster data</a:t>
+            </a:r>
+          </a:p>
+        </p:txBody>
+      </p:sp>
+      <p:sp>
+        <p:nvSpPr>
+          <p:cNvPr id="4" name="Text Placeholder 3">
+            <a:extLst>
+              <a:ext uri="{FF2B5EF4-FFF2-40B4-BE49-F238E27FC236}">
+                <a16:creationId xmlns:a16="http://schemas.microsoft.com/office/drawing/2014/main" id="{303692FC-AA04-5449-B181-12607485A379}"/>
+              </a:ext>
+            </a:extLst>
+          </p:cNvPr>
+          <p:cNvSpPr>
+            <a:spLocks noGrp="1"/>
+          </p:cNvSpPr>
+          <p:nvPr>
+            <p:ph type="body" sz="quarter" idx="11"/>
+          </p:nvPr>
+        </p:nvSpPr>
+        <p:spPr>
+          <a:xfrm>
+            <a:off x="374493" y="1339135"/>
+            <a:ext cx="5221974" cy="2288381"/>
+          </a:xfrm>
+        </p:spPr>
+        <p:txBody>
+          <a:bodyPr/>
+          <a:lstStyle/>
+          <a:p>
+            <a:pPr marL="285750" indent="-285750">
+              <a:buFont typeface="Wingdings" pitchFamily="2" charset="2"/>
+              <a:buChar char="§"/>
+            </a:pPr>
+            <a:r>
+              <a:rPr lang="en-US" sz="1600" dirty="0"/>
+              <a:t>A geospatial raster is only different from a digital photo in that it is accompanied by spatial information that connects the data to a particular location. </a:t>
+            </a:r>
+          </a:p>
+          <a:p>
+            <a:pPr marL="285750" indent="-285750">
+              <a:buFont typeface="Wingdings" pitchFamily="2" charset="2"/>
+              <a:buChar char="§"/>
+            </a:pPr>
+            <a:r>
+              <a:rPr lang="en-US" sz="1600" dirty="0"/>
+              <a:t>This includes items such as a raster’s </a:t>
+            </a:r>
+            <a:r>
+              <a:rPr lang="en-US" sz="1600" b="1" dirty="0"/>
+              <a:t>extent</a:t>
+            </a:r>
+            <a:r>
+              <a:rPr lang="en-US" sz="1600" dirty="0"/>
+              <a:t> and </a:t>
+            </a:r>
+            <a:r>
+              <a:rPr lang="en-US" sz="1600" b="1" dirty="0"/>
+              <a:t>cell size</a:t>
+            </a:r>
+            <a:r>
+              <a:rPr lang="en-US" sz="1600" dirty="0"/>
+              <a:t>, the number of rows and columns, its </a:t>
+            </a:r>
+            <a:r>
+              <a:rPr lang="en-US" sz="1600" b="1" dirty="0"/>
+              <a:t>projection</a:t>
+            </a:r>
+            <a:r>
+              <a:rPr lang="en-US" sz="1600" dirty="0"/>
+              <a:t> and </a:t>
+            </a:r>
+            <a:r>
+              <a:rPr lang="en-US" sz="1600" b="1" dirty="0"/>
+              <a:t>coordinate reference system (or CRS), </a:t>
+            </a:r>
+            <a:r>
+              <a:rPr lang="en-US" sz="1600" dirty="0"/>
+              <a:t>as well as any associated attribute information.</a:t>
             </a:r>
           </a:p>
         </p:txBody>
       </p:sp>
       <p:pic>
         <p:nvPicPr>
-          <p:cNvPr id="6" name="Picture 5" descr="A screenshot of a computer screen&#10;&#10;Description automatically generated">
+          <p:cNvPr id="7" name="Picture 6" descr="A screenshot of a cell phone&#10;&#10;Description automatically generated">
             <a:extLst>
               <a:ext uri="{FF2B5EF4-FFF2-40B4-BE49-F238E27FC236}">
-                <a16:creationId xmlns:a16="http://schemas.microsoft.com/office/drawing/2014/main" id="{1FB13176-2D28-A64D-990E-DBE0E8302F78}"/>
+                <a16:creationId xmlns:a16="http://schemas.microsoft.com/office/drawing/2014/main" id="{D4F6DBE4-30A2-8D48-A005-63D093E77EE0}"/>
               </a:ext>
             </a:extLst>
           </p:cNvPr>
@@ -2770,56 +2850,20 @@
         </p:blipFill>
         <p:spPr>
           <a:xfrm>
-            <a:off x="923517" y="1165104"/>
-            <a:ext cx="3852334" cy="2949696"/>
+            <a:off x="5698001" y="1130300"/>
+            <a:ext cx="2981570" cy="2882900"/>
           </a:xfrm>
           <a:prstGeom prst="rect">
             <a:avLst/>
           </a:prstGeom>
         </p:spPr>
       </p:pic>
-      <p:pic>
-        <p:nvPicPr>
-          <p:cNvPr id="10" name="Picture 9" descr="A screenshot of a computer&#10;&#10;Description automatically generated">
+      <p:sp>
+        <p:nvSpPr>
+          <p:cNvPr id="11" name="Text Placeholder 2">
             <a:extLst>
               <a:ext uri="{FF2B5EF4-FFF2-40B4-BE49-F238E27FC236}">
-                <a16:creationId xmlns:a16="http://schemas.microsoft.com/office/drawing/2014/main" id="{549EB2D4-C3CA-1546-AE41-21827BC80183}"/>
-              </a:ext>
-            </a:extLst>
-          </p:cNvPr>
-          <p:cNvPicPr>
-            <a:picLocks noChangeAspect="1"/>
-          </p:cNvPicPr>
-          <p:nvPr/>
-        </p:nvPicPr>
-        <p:blipFill>
-          <a:blip r:embed="rId3">
-            <a:extLst>
-              <a:ext uri="{28A0092B-C50C-407E-A947-70E740481C1C}">
-                <a14:useLocalDpi xmlns:a14="http://schemas.microsoft.com/office/drawing/2010/main" val="0"/>
-              </a:ext>
-            </a:extLst>
-          </a:blip>
-          <a:stretch>
-            <a:fillRect/>
-          </a:stretch>
-        </p:blipFill>
-        <p:spPr>
-          <a:xfrm>
-            <a:off x="4572000" y="1165104"/>
-            <a:ext cx="4239631" cy="3084626"/>
-          </a:xfrm>
-          <a:prstGeom prst="rect">
-            <a:avLst/>
-          </a:prstGeom>
-        </p:spPr>
-      </p:pic>
-      <p:sp>
-        <p:nvSpPr>
-          <p:cNvPr id="16" name="Text Placeholder 2">
-            <a:extLst>
-              <a:ext uri="{FF2B5EF4-FFF2-40B4-BE49-F238E27FC236}">
-                <a16:creationId xmlns:a16="http://schemas.microsoft.com/office/drawing/2014/main" id="{D9CAF97D-7FBC-DD4C-9A07-2316642C3F29}"/>
+                <a16:creationId xmlns:a16="http://schemas.microsoft.com/office/drawing/2014/main" id="{F8B84098-D64F-854C-A503-8C58441AADCC}"/>
               </a:ext>
             </a:extLst>
           </p:cNvPr>
@@ -2850,7 +2894,7 @@
     </p:spTree>
     <p:extLst>
       <p:ext uri="{BB962C8B-B14F-4D97-AF65-F5344CB8AC3E}">
-        <p14:creationId xmlns:p14="http://schemas.microsoft.com/office/powerpoint/2010/main" val="862045456"/>
+        <p14:creationId xmlns:p14="http://schemas.microsoft.com/office/powerpoint/2010/main" val="1081709012"/>
       </p:ext>
     </p:extLst>
   </p:cSld>
@@ -2882,7 +2926,7 @@
           <p:cNvPr id="2" name="Title 1">
             <a:extLst>
               <a:ext uri="{FF2B5EF4-FFF2-40B4-BE49-F238E27FC236}">
-                <a16:creationId xmlns:a16="http://schemas.microsoft.com/office/drawing/2014/main" id="{012322C8-7E00-364B-ADFB-9F14A7CD7D58}"/>
+                <a16:creationId xmlns:a16="http://schemas.microsoft.com/office/drawing/2014/main" id="{AD43E6D5-2C05-214D-95B2-C269788BB384}"/>
               </a:ext>
             </a:extLst>
           </p:cNvPr>
@@ -2900,114 +2944,17 @@
           <a:p>
             <a:r>
               <a:rPr lang="en-US" dirty="0"/>
-              <a:t>Important aspects to </a:t>
-            </a:r>
-            <a:r>
-              <a:rPr lang="en-US" dirty="0" err="1"/>
-              <a:t>rasters</a:t>
-            </a:r>
-            <a:endParaRPr lang="en-US" dirty="0"/>
-          </a:p>
-        </p:txBody>
-      </p:sp>
-      <p:sp>
-        <p:nvSpPr>
-          <p:cNvPr id="4" name="Text Placeholder 3">
-            <a:extLst>
-              <a:ext uri="{FF2B5EF4-FFF2-40B4-BE49-F238E27FC236}">
-                <a16:creationId xmlns:a16="http://schemas.microsoft.com/office/drawing/2014/main" id="{C5D56D07-5FE7-0747-BD38-8CCF7395E46C}"/>
-              </a:ext>
-            </a:extLst>
-          </p:cNvPr>
-          <p:cNvSpPr>
-            <a:spLocks noGrp="1"/>
-          </p:cNvSpPr>
-          <p:nvPr>
-            <p:ph type="body" sz="quarter" idx="11"/>
-          </p:nvPr>
-        </p:nvSpPr>
-        <p:spPr>
-          <a:xfrm>
-            <a:off x="374494" y="1339135"/>
-            <a:ext cx="3757240" cy="2288381"/>
-          </a:xfrm>
-        </p:spPr>
-        <p:txBody>
-          <a:bodyPr/>
-          <a:lstStyle/>
-          <a:p>
-            <a:pPr marL="285750" indent="-285750">
-              <a:buFont typeface="Wingdings" pitchFamily="2" charset="2"/>
-              <a:buChar char="§"/>
-            </a:pPr>
-            <a:r>
-              <a:rPr lang="en-US" b="1" dirty="0">
-                <a:solidFill>
-                  <a:srgbClr val="FF0000"/>
-                </a:solidFill>
-              </a:rPr>
-              <a:t>Spatial extent</a:t>
-            </a:r>
-          </a:p>
-          <a:p>
-            <a:pPr marL="285750" indent="-285750">
-              <a:buFont typeface="Wingdings" pitchFamily="2" charset="2"/>
-              <a:buChar char="§"/>
-            </a:pPr>
-            <a:r>
-              <a:rPr lang="en-US" dirty="0"/>
-              <a:t>Resolution</a:t>
-            </a:r>
-          </a:p>
-          <a:p>
-            <a:pPr marL="662940" lvl="1" indent="-285750">
-              <a:buFont typeface="Wingdings" pitchFamily="2" charset="2"/>
-              <a:buChar char="§"/>
-            </a:pPr>
-            <a:r>
-              <a:rPr lang="en-US" dirty="0"/>
-              <a:t>We will focus on </a:t>
-            </a:r>
-            <a:r>
-              <a:rPr lang="en-US" b="1" dirty="0"/>
-              <a:t>spatial</a:t>
-            </a:r>
-            <a:r>
-              <a:rPr lang="en-US" dirty="0"/>
-              <a:t> resolution, but there are other forms of resolution, including </a:t>
-            </a:r>
-            <a:r>
-              <a:rPr lang="en-US" b="1" dirty="0"/>
-              <a:t>spectral</a:t>
-            </a:r>
-            <a:r>
-              <a:rPr lang="en-US" dirty="0"/>
-              <a:t>, </a:t>
-            </a:r>
-            <a:r>
-              <a:rPr lang="en-US" b="1" dirty="0"/>
-              <a:t>temporal</a:t>
-            </a:r>
-            <a:r>
-              <a:rPr lang="en-US" dirty="0"/>
-              <a:t>, and </a:t>
-            </a:r>
-            <a:r>
-              <a:rPr lang="en-US" b="1" dirty="0"/>
-              <a:t>radiometric</a:t>
-            </a:r>
-          </a:p>
-          <a:p>
-            <a:endParaRPr lang="en-US" dirty="0"/>
+              <a:t>Continuous vs categorical</a:t>
+            </a:r>
           </a:p>
         </p:txBody>
       </p:sp>
       <p:pic>
         <p:nvPicPr>
-          <p:cNvPr id="7" name="Picture 6" descr="A close up of a map&#10;&#10;Description automatically generated">
+          <p:cNvPr id="6" name="Picture 5" descr="A screenshot of a computer screen&#10;&#10;Description automatically generated">
             <a:extLst>
               <a:ext uri="{FF2B5EF4-FFF2-40B4-BE49-F238E27FC236}">
-                <a16:creationId xmlns:a16="http://schemas.microsoft.com/office/drawing/2014/main" id="{E3DF776F-918D-B344-8317-93903FF15D65}"/>
+                <a16:creationId xmlns:a16="http://schemas.microsoft.com/office/drawing/2014/main" id="{1FB13176-2D28-A64D-990E-DBE0E8302F78}"/>
               </a:ext>
             </a:extLst>
           </p:cNvPr>
@@ -3030,20 +2977,56 @@
         </p:blipFill>
         <p:spPr>
           <a:xfrm>
-            <a:off x="4030939" y="1264381"/>
-            <a:ext cx="5053796" cy="2288381"/>
+            <a:off x="923517" y="1165104"/>
+            <a:ext cx="3852334" cy="2949696"/>
           </a:xfrm>
           <a:prstGeom prst="rect">
             <a:avLst/>
           </a:prstGeom>
         </p:spPr>
       </p:pic>
-      <p:sp>
-        <p:nvSpPr>
-          <p:cNvPr id="13" name="Text Placeholder 2">
+      <p:pic>
+        <p:nvPicPr>
+          <p:cNvPr id="10" name="Picture 9" descr="A screenshot of a computer&#10;&#10;Description automatically generated">
             <a:extLst>
               <a:ext uri="{FF2B5EF4-FFF2-40B4-BE49-F238E27FC236}">
-                <a16:creationId xmlns:a16="http://schemas.microsoft.com/office/drawing/2014/main" id="{2B5B9ABE-B4FA-5846-9D84-BCD9CFFE6DA4}"/>
+                <a16:creationId xmlns:a16="http://schemas.microsoft.com/office/drawing/2014/main" id="{549EB2D4-C3CA-1546-AE41-21827BC80183}"/>
+              </a:ext>
+            </a:extLst>
+          </p:cNvPr>
+          <p:cNvPicPr>
+            <a:picLocks noChangeAspect="1"/>
+          </p:cNvPicPr>
+          <p:nvPr/>
+        </p:nvPicPr>
+        <p:blipFill>
+          <a:blip r:embed="rId3">
+            <a:extLst>
+              <a:ext uri="{28A0092B-C50C-407E-A947-70E740481C1C}">
+                <a14:useLocalDpi xmlns:a14="http://schemas.microsoft.com/office/drawing/2010/main" val="0"/>
+              </a:ext>
+            </a:extLst>
+          </a:blip>
+          <a:stretch>
+            <a:fillRect/>
+          </a:stretch>
+        </p:blipFill>
+        <p:spPr>
+          <a:xfrm>
+            <a:off x="4572000" y="1165104"/>
+            <a:ext cx="4239631" cy="3084626"/>
+          </a:xfrm>
+          <a:prstGeom prst="rect">
+            <a:avLst/>
+          </a:prstGeom>
+        </p:spPr>
+      </p:pic>
+      <p:sp>
+        <p:nvSpPr>
+          <p:cNvPr id="16" name="Text Placeholder 2">
+            <a:extLst>
+              <a:ext uri="{FF2B5EF4-FFF2-40B4-BE49-F238E27FC236}">
+                <a16:creationId xmlns:a16="http://schemas.microsoft.com/office/drawing/2014/main" id="{D9CAF97D-7FBC-DD4C-9A07-2316642C3F29}"/>
               </a:ext>
             </a:extLst>
           </p:cNvPr>
@@ -3074,7 +3057,7 @@
     </p:spTree>
     <p:extLst>
       <p:ext uri="{BB962C8B-B14F-4D97-AF65-F5344CB8AC3E}">
-        <p14:creationId xmlns:p14="http://schemas.microsoft.com/office/powerpoint/2010/main" val="3761367588"/>
+        <p14:creationId xmlns:p14="http://schemas.microsoft.com/office/powerpoint/2010/main" val="862045456"/>
       </p:ext>
     </p:extLst>
   </p:cSld>
@@ -3152,23 +3135,13 @@
         </p:nvSpPr>
         <p:spPr>
           <a:xfrm>
-            <a:off x="374493" y="1339135"/>
-            <a:ext cx="4095907" cy="2288381"/>
+            <a:off x="374494" y="1339135"/>
+            <a:ext cx="3757240" cy="2288381"/>
           </a:xfrm>
         </p:spPr>
         <p:txBody>
           <a:bodyPr/>
           <a:lstStyle/>
-          <a:p>
-            <a:pPr marL="285750" indent="-285750">
-              <a:buFont typeface="Wingdings" pitchFamily="2" charset="2"/>
-              <a:buChar char="§"/>
-            </a:pPr>
-            <a:r>
-              <a:rPr lang="en-US" dirty="0"/>
-              <a:t>Spatial extent</a:t>
-            </a:r>
-          </a:p>
           <a:p>
             <a:pPr marL="285750" indent="-285750">
               <a:buFont typeface="Wingdings" pitchFamily="2" charset="2"/>
@@ -3180,6 +3153,16 @@
                   <a:srgbClr val="FF0000"/>
                 </a:solidFill>
               </a:rPr>
+              <a:t>Spatial extent</a:t>
+            </a:r>
+          </a:p>
+          <a:p>
+            <a:pPr marL="285750" indent="-285750">
+              <a:buFont typeface="Wingdings" pitchFamily="2" charset="2"/>
+              <a:buChar char="§"/>
+            </a:pPr>
+            <a:r>
+              <a:rPr lang="en-US" dirty="0"/>
               <a:t>Resolution</a:t>
             </a:r>
           </a:p>
@@ -3190,7 +3173,15 @@
             </a:pPr>
             <a:r>
               <a:rPr lang="en-US" dirty="0"/>
-              <a:t>We will focus on spatial resolution, but there are other forms of resolution, including </a:t>
+              <a:t>We will focus on </a:t>
+            </a:r>
+            <a:r>
+              <a:rPr lang="en-US" b="1" dirty="0"/>
+              <a:t>spatial</a:t>
+            </a:r>
+            <a:r>
+              <a:rPr lang="en-US" dirty="0"/>
+              <a:t> resolution, but there are other forms of resolution, including </a:t>
             </a:r>
             <a:r>
               <a:rPr lang="en-US" b="1" dirty="0"/>
@@ -3220,10 +3211,10 @@
       </p:sp>
       <p:pic>
         <p:nvPicPr>
-          <p:cNvPr id="7" name="Picture 6" descr="A picture containing animal, bird&#10;&#10;Description automatically generated">
+          <p:cNvPr id="7" name="Picture 6" descr="A close up of a map&#10;&#10;Description automatically generated">
             <a:extLst>
               <a:ext uri="{FF2B5EF4-FFF2-40B4-BE49-F238E27FC236}">
-                <a16:creationId xmlns:a16="http://schemas.microsoft.com/office/drawing/2014/main" id="{44BD83C3-B507-FE49-87F1-CE8D1B6A2777}"/>
+                <a16:creationId xmlns:a16="http://schemas.microsoft.com/office/drawing/2014/main" id="{E3DF776F-918D-B344-8317-93903FF15D65}"/>
               </a:ext>
             </a:extLst>
           </p:cNvPr>
@@ -3246,8 +3237,8 @@
         </p:blipFill>
         <p:spPr>
           <a:xfrm>
-            <a:off x="4319699" y="1264381"/>
-            <a:ext cx="4724817" cy="1642533"/>
+            <a:off x="4030939" y="1264381"/>
+            <a:ext cx="5053796" cy="2288381"/>
           </a:xfrm>
           <a:prstGeom prst="rect">
             <a:avLst/>
@@ -3256,10 +3247,10 @@
       </p:pic>
       <p:sp>
         <p:nvSpPr>
-          <p:cNvPr id="15" name="Text Placeholder 2">
+          <p:cNvPr id="13" name="Text Placeholder 2">
             <a:extLst>
               <a:ext uri="{FF2B5EF4-FFF2-40B4-BE49-F238E27FC236}">
-                <a16:creationId xmlns:a16="http://schemas.microsoft.com/office/drawing/2014/main" id="{77694DF0-3C9D-3F4D-9CC2-42DE03C8F133}"/>
+                <a16:creationId xmlns:a16="http://schemas.microsoft.com/office/drawing/2014/main" id="{2B5B9ABE-B4FA-5846-9D84-BCD9CFFE6DA4}"/>
               </a:ext>
             </a:extLst>
           </p:cNvPr>
@@ -3290,7 +3281,7 @@
     </p:spTree>
     <p:extLst>
       <p:ext uri="{BB962C8B-B14F-4D97-AF65-F5344CB8AC3E}">
-        <p14:creationId xmlns:p14="http://schemas.microsoft.com/office/powerpoint/2010/main" val="1746575140"/>
+        <p14:creationId xmlns:p14="http://schemas.microsoft.com/office/powerpoint/2010/main" val="3761367588"/>
       </p:ext>
     </p:extLst>
   </p:cSld>
@@ -3436,15 +3427,15 @@
       </p:sp>
       <p:pic>
         <p:nvPicPr>
-          <p:cNvPr id="5" name="Picture 2" descr="http://www.geog.ucsb.edu/~jeff/projects/thesis/image013.jpg">
+          <p:cNvPr id="7" name="Picture 6" descr="A picture containing animal, bird&#10;&#10;Description automatically generated">
             <a:extLst>
               <a:ext uri="{FF2B5EF4-FFF2-40B4-BE49-F238E27FC236}">
-                <a16:creationId xmlns:a16="http://schemas.microsoft.com/office/drawing/2014/main" id="{021A5FD0-BCEB-644B-B476-F28444051F49}"/>
+                <a16:creationId xmlns:a16="http://schemas.microsoft.com/office/drawing/2014/main" id="{44BD83C3-B507-FE49-87F1-CE8D1B6A2777}"/>
               </a:ext>
             </a:extLst>
           </p:cNvPr>
           <p:cNvPicPr>
-            <a:picLocks noChangeAspect="1" noChangeArrowheads="1"/>
+            <a:picLocks noChangeAspect="1"/>
           </p:cNvPicPr>
           <p:nvPr/>
         </p:nvPicPr>
@@ -3456,37 +3447,26 @@
               </a:ext>
             </a:extLst>
           </a:blip>
-          <a:srcRect/>
           <a:stretch>
             <a:fillRect/>
           </a:stretch>
         </p:blipFill>
-        <p:spPr bwMode="auto">
-          <a:xfrm>
-            <a:off x="4572000" y="1338211"/>
-            <a:ext cx="3543731" cy="2467077"/>
+        <p:spPr>
+          <a:xfrm>
+            <a:off x="4319699" y="1264381"/>
+            <a:ext cx="4724817" cy="1642533"/>
           </a:xfrm>
           <a:prstGeom prst="rect">
             <a:avLst/>
           </a:prstGeom>
-          <a:noFill/>
-          <a:extLst>
-            <a:ext uri="{909E8E84-426E-40DD-AFC4-6F175D3DCCD1}">
-              <a14:hiddenFill xmlns:a14="http://schemas.microsoft.com/office/drawing/2010/main">
-                <a:solidFill>
-                  <a:srgbClr val="FFFFFF"/>
-                </a:solidFill>
-              </a14:hiddenFill>
-            </a:ext>
-          </a:extLst>
         </p:spPr>
       </p:pic>
       <p:sp>
         <p:nvSpPr>
-          <p:cNvPr id="8" name="Text Placeholder 2">
+          <p:cNvPr id="15" name="Text Placeholder 2">
             <a:extLst>
               <a:ext uri="{FF2B5EF4-FFF2-40B4-BE49-F238E27FC236}">
-                <a16:creationId xmlns:a16="http://schemas.microsoft.com/office/drawing/2014/main" id="{80BA42BF-5550-8543-9FE0-0E68E6005D13}"/>
+                <a16:creationId xmlns:a16="http://schemas.microsoft.com/office/drawing/2014/main" id="{77694DF0-3C9D-3F4D-9CC2-42DE03C8F133}"/>
               </a:ext>
             </a:extLst>
           </p:cNvPr>
@@ -3500,7 +3480,7 @@
         <p:spPr>
           <a:xfrm>
             <a:off x="337760" y="292626"/>
-            <a:ext cx="4056440" cy="279834"/>
+            <a:ext cx="4234240" cy="279834"/>
           </a:xfrm>
         </p:spPr>
         <p:txBody>
@@ -3517,7 +3497,7 @@
     </p:spTree>
     <p:extLst>
       <p:ext uri="{BB962C8B-B14F-4D97-AF65-F5344CB8AC3E}">
-        <p14:creationId xmlns:p14="http://schemas.microsoft.com/office/powerpoint/2010/main" val="3036492954"/>
+        <p14:creationId xmlns:p14="http://schemas.microsoft.com/office/powerpoint/2010/main" val="1746575140"/>
       </p:ext>
     </p:extLst>
   </p:cSld>
@@ -3567,22 +3547,111 @@
           <a:p>
             <a:r>
               <a:rPr lang="en-US" dirty="0"/>
-              <a:t>Multi-band/multi-spectral data</a:t>
-            </a:r>
+              <a:t>Important aspects to </a:t>
+            </a:r>
+            <a:r>
+              <a:rPr lang="en-US" dirty="0" err="1"/>
+              <a:t>rasters</a:t>
+            </a:r>
+            <a:endParaRPr lang="en-US" dirty="0"/>
+          </a:p>
+        </p:txBody>
+      </p:sp>
+      <p:sp>
+        <p:nvSpPr>
+          <p:cNvPr id="4" name="Text Placeholder 3">
+            <a:extLst>
+              <a:ext uri="{FF2B5EF4-FFF2-40B4-BE49-F238E27FC236}">
+                <a16:creationId xmlns:a16="http://schemas.microsoft.com/office/drawing/2014/main" id="{C5D56D07-5FE7-0747-BD38-8CCF7395E46C}"/>
+              </a:ext>
+            </a:extLst>
+          </p:cNvPr>
+          <p:cNvSpPr>
+            <a:spLocks noGrp="1"/>
+          </p:cNvSpPr>
+          <p:nvPr>
+            <p:ph type="body" sz="quarter" idx="11"/>
+          </p:nvPr>
+        </p:nvSpPr>
+        <p:spPr>
+          <a:xfrm>
+            <a:off x="374493" y="1339135"/>
+            <a:ext cx="4095907" cy="2288381"/>
+          </a:xfrm>
+        </p:spPr>
+        <p:txBody>
+          <a:bodyPr/>
+          <a:lstStyle/>
+          <a:p>
+            <a:pPr marL="285750" indent="-285750">
+              <a:buFont typeface="Wingdings" pitchFamily="2" charset="2"/>
+              <a:buChar char="§"/>
+            </a:pPr>
+            <a:r>
+              <a:rPr lang="en-US" dirty="0"/>
+              <a:t>Spatial extent</a:t>
+            </a:r>
+          </a:p>
+          <a:p>
+            <a:pPr marL="285750" indent="-285750">
+              <a:buFont typeface="Wingdings" pitchFamily="2" charset="2"/>
+              <a:buChar char="§"/>
+            </a:pPr>
+            <a:r>
+              <a:rPr lang="en-US" b="1" dirty="0">
+                <a:solidFill>
+                  <a:srgbClr val="FF0000"/>
+                </a:solidFill>
+              </a:rPr>
+              <a:t>Resolution</a:t>
+            </a:r>
+          </a:p>
+          <a:p>
+            <a:pPr marL="662940" lvl="1" indent="-285750">
+              <a:buFont typeface="Wingdings" pitchFamily="2" charset="2"/>
+              <a:buChar char="§"/>
+            </a:pPr>
+            <a:r>
+              <a:rPr lang="en-US" dirty="0"/>
+              <a:t>We will focus on spatial resolution, but there are other forms of resolution, including </a:t>
+            </a:r>
+            <a:r>
+              <a:rPr lang="en-US" b="1" dirty="0"/>
+              <a:t>spectral</a:t>
+            </a:r>
+            <a:r>
+              <a:rPr lang="en-US" dirty="0"/>
+              <a:t>, </a:t>
+            </a:r>
+            <a:r>
+              <a:rPr lang="en-US" b="1" dirty="0"/>
+              <a:t>temporal</a:t>
+            </a:r>
+            <a:r>
+              <a:rPr lang="en-US" dirty="0"/>
+              <a:t>, and </a:t>
+            </a:r>
+            <a:r>
+              <a:rPr lang="en-US" b="1" dirty="0"/>
+              <a:t>radiometric</a:t>
+            </a:r>
+          </a:p>
+          <a:p>
+            <a:endParaRPr lang="en-US" dirty="0"/>
           </a:p>
         </p:txBody>
       </p:sp>
       <p:pic>
         <p:nvPicPr>
-          <p:cNvPr id="9" name="Picture 8" descr="A picture containing computer, table, sitting, green&#10;&#10;Description automatically generated">
+          <p:cNvPr id="5" name="Picture 2" descr="http://www.geog.ucsb.edu/~jeff/projects/thesis/image013.jpg">
             <a:extLst>
               <a:ext uri="{FF2B5EF4-FFF2-40B4-BE49-F238E27FC236}">
-                <a16:creationId xmlns:a16="http://schemas.microsoft.com/office/drawing/2014/main" id="{BF71AEAA-64F6-7940-A0D0-4FF581CB8A26}"/>
+                <a16:creationId xmlns:a16="http://schemas.microsoft.com/office/drawing/2014/main" id="{021A5FD0-BCEB-644B-B476-F28444051F49}"/>
               </a:ext>
             </a:extLst>
           </p:cNvPr>
           <p:cNvPicPr>
-            <a:picLocks noChangeAspect="1"/>
+            <a:picLocks noChangeAspect="1" noChangeArrowheads="1"/>
           </p:cNvPicPr>
           <p:nvPr/>
         </p:nvPicPr>
@@ -3594,26 +3663,37 @@
               </a:ext>
             </a:extLst>
           </a:blip>
+          <a:srcRect/>
           <a:stretch>
             <a:fillRect/>
           </a:stretch>
         </p:blipFill>
-        <p:spPr>
-          <a:xfrm>
-            <a:off x="4131734" y="1264381"/>
-            <a:ext cx="4892211" cy="2684663"/>
+        <p:spPr bwMode="auto">
+          <a:xfrm>
+            <a:off x="4572000" y="1338211"/>
+            <a:ext cx="3543731" cy="2467077"/>
           </a:xfrm>
           <a:prstGeom prst="rect">
             <a:avLst/>
           </a:prstGeom>
+          <a:noFill/>
+          <a:extLst>
+            <a:ext uri="{909E8E84-426E-40DD-AFC4-6F175D3DCCD1}">
+              <a14:hiddenFill xmlns:a14="http://schemas.microsoft.com/office/drawing/2010/main">
+                <a:solidFill>
+                  <a:srgbClr val="FFFFFF"/>
+                </a:solidFill>
+              </a14:hiddenFill>
+            </a:ext>
+          </a:extLst>
         </p:spPr>
       </p:pic>
       <p:sp>
         <p:nvSpPr>
-          <p:cNvPr id="11" name="Text Placeholder 3">
+          <p:cNvPr id="8" name="Text Placeholder 2">
             <a:extLst>
               <a:ext uri="{FF2B5EF4-FFF2-40B4-BE49-F238E27FC236}">
-                <a16:creationId xmlns:a16="http://schemas.microsoft.com/office/drawing/2014/main" id="{C25E8A40-1ADE-F146-ABBE-128C54E1C877}"/>
+                <a16:creationId xmlns:a16="http://schemas.microsoft.com/office/drawing/2014/main" id="{80BA42BF-5550-8543-9FE0-0E68E6005D13}"/>
               </a:ext>
             </a:extLst>
           </p:cNvPr>
@@ -3621,106 +3701,13 @@
             <a:spLocks noGrp="1"/>
           </p:cNvSpPr>
           <p:nvPr>
-            <p:ph type="body" sz="quarter" idx="11"/>
+            <p:ph type="body" sz="quarter" idx="10"/>
           </p:nvPr>
         </p:nvSpPr>
         <p:spPr>
           <a:xfrm>
-            <a:off x="374494" y="1264381"/>
-            <a:ext cx="4197506" cy="2288381"/>
-          </a:xfrm>
-        </p:spPr>
-        <p:txBody>
-          <a:bodyPr/>
-          <a:lstStyle/>
-          <a:p>
-            <a:pPr marL="285750" indent="-285750">
-              <a:buFont typeface="Wingdings" pitchFamily="2" charset="2"/>
-              <a:buChar char="§"/>
-            </a:pPr>
-            <a:r>
-              <a:rPr lang="en-US" sz="1600" dirty="0"/>
-              <a:t>A raster can contain one or more bands. </a:t>
-            </a:r>
-          </a:p>
-          <a:p>
-            <a:pPr marL="285750" indent="-285750">
-              <a:buFont typeface="Wingdings" pitchFamily="2" charset="2"/>
-              <a:buChar char="§"/>
-            </a:pPr>
-            <a:r>
-              <a:rPr lang="en-US" sz="1600" dirty="0"/>
-              <a:t>One type of multi-band raster dataset that is familiar to many of us is a color image. </a:t>
-            </a:r>
-          </a:p>
-          <a:p>
-            <a:pPr marL="285750" indent="-285750">
-              <a:buFont typeface="Wingdings" pitchFamily="2" charset="2"/>
-              <a:buChar char="§"/>
-            </a:pPr>
-            <a:r>
-              <a:rPr lang="en-US" sz="1600" dirty="0"/>
-              <a:t>A basic color image consists of three bands: </a:t>
-            </a:r>
-            <a:r>
-              <a:rPr lang="en-US" sz="1600" dirty="0">
-                <a:solidFill>
-                  <a:srgbClr val="FF0000"/>
-                </a:solidFill>
-              </a:rPr>
-              <a:t>red</a:t>
-            </a:r>
-            <a:r>
-              <a:rPr lang="en-US" sz="1600" dirty="0"/>
-              <a:t>, </a:t>
-            </a:r>
-            <a:r>
-              <a:rPr lang="en-US" sz="1600" dirty="0">
-                <a:solidFill>
-                  <a:srgbClr val="00B050"/>
-                </a:solidFill>
-              </a:rPr>
-              <a:t>green</a:t>
-            </a:r>
-            <a:r>
-              <a:rPr lang="en-US" sz="1600" dirty="0"/>
-              <a:t>, and </a:t>
-            </a:r>
-            <a:r>
-              <a:rPr lang="en-US" sz="1600" dirty="0">
-                <a:solidFill>
-                  <a:schemeClr val="tx2"/>
-                </a:solidFill>
-              </a:rPr>
-              <a:t>blue</a:t>
-            </a:r>
-            <a:r>
-              <a:rPr lang="en-US" sz="1600" dirty="0"/>
-              <a:t>. Each band represents light reflected from the red, green or blue portions of the electromagnetic spectrum.</a:t>
-            </a:r>
-          </a:p>
-        </p:txBody>
-      </p:sp>
-      <p:sp>
-        <p:nvSpPr>
-          <p:cNvPr id="14" name="Text Placeholder 2">
-            <a:extLst>
-              <a:ext uri="{FF2B5EF4-FFF2-40B4-BE49-F238E27FC236}">
-                <a16:creationId xmlns:a16="http://schemas.microsoft.com/office/drawing/2014/main" id="{4395FFB7-0801-7740-8C8B-83CC9B00BAC3}"/>
-              </a:ext>
-            </a:extLst>
-          </p:cNvPr>
-          <p:cNvSpPr>
-            <a:spLocks noGrp="1"/>
-          </p:cNvSpPr>
-          <p:nvPr>
-            <p:ph type="body" sz="quarter" idx="10"/>
-          </p:nvPr>
-        </p:nvSpPr>
-        <p:spPr>
-          <a:xfrm>
             <a:off x="337760" y="292626"/>
-            <a:ext cx="4158040" cy="279834"/>
+            <a:ext cx="4056440" cy="279834"/>
           </a:xfrm>
         </p:spPr>
         <p:txBody>
@@ -3737,7 +3724,7 @@
     </p:spTree>
     <p:extLst>
       <p:ext uri="{BB962C8B-B14F-4D97-AF65-F5344CB8AC3E}">
-        <p14:creationId xmlns:p14="http://schemas.microsoft.com/office/powerpoint/2010/main" val="2074096631"/>
+        <p14:creationId xmlns:p14="http://schemas.microsoft.com/office/powerpoint/2010/main" val="3036492954"/>
       </p:ext>
     </p:extLst>
   </p:cSld>
@@ -3787,11 +3774,47 @@
           <a:p>
             <a:r>
               <a:rPr lang="en-US" dirty="0"/>
-              <a:t>Coordinate Reference Systems</a:t>
-            </a:r>
-          </a:p>
-        </p:txBody>
-      </p:sp>
+              <a:t>Multi-band/multi-spectral data</a:t>
+            </a:r>
+          </a:p>
+        </p:txBody>
+      </p:sp>
+      <p:pic>
+        <p:nvPicPr>
+          <p:cNvPr id="9" name="Picture 8" descr="A picture containing computer, table, sitting, green&#10;&#10;Description automatically generated">
+            <a:extLst>
+              <a:ext uri="{FF2B5EF4-FFF2-40B4-BE49-F238E27FC236}">
+                <a16:creationId xmlns:a16="http://schemas.microsoft.com/office/drawing/2014/main" id="{BF71AEAA-64F6-7940-A0D0-4FF581CB8A26}"/>
+              </a:ext>
+            </a:extLst>
+          </p:cNvPr>
+          <p:cNvPicPr>
+            <a:picLocks noChangeAspect="1"/>
+          </p:cNvPicPr>
+          <p:nvPr/>
+        </p:nvPicPr>
+        <p:blipFill>
+          <a:blip r:embed="rId2">
+            <a:extLst>
+              <a:ext uri="{28A0092B-C50C-407E-A947-70E740481C1C}">
+                <a14:useLocalDpi xmlns:a14="http://schemas.microsoft.com/office/drawing/2010/main" val="0"/>
+              </a:ext>
+            </a:extLst>
+          </a:blip>
+          <a:stretch>
+            <a:fillRect/>
+          </a:stretch>
+        </p:blipFill>
+        <p:spPr>
+          <a:xfrm>
+            <a:off x="4131734" y="1264381"/>
+            <a:ext cx="4892211" cy="2684663"/>
+          </a:xfrm>
+          <a:prstGeom prst="rect">
+            <a:avLst/>
+          </a:prstGeom>
+        </p:spPr>
+      </p:pic>
       <p:sp>
         <p:nvSpPr>
           <p:cNvPr id="11" name="Text Placeholder 3">
@@ -3810,8 +3833,8 @@
         </p:nvSpPr>
         <p:spPr>
           <a:xfrm>
-            <a:off x="733997" y="1064298"/>
-            <a:ext cx="7423308" cy="2288381"/>
+            <a:off x="374494" y="1264381"/>
+            <a:ext cx="4197506" cy="2288381"/>
           </a:xfrm>
         </p:spPr>
         <p:txBody>
@@ -3823,8 +3846,8 @@
               <a:buChar char="§"/>
             </a:pPr>
             <a:r>
-              <a:rPr lang="en-US" dirty="0"/>
-              <a:t>The CRS associated with a dataset tells your mapping software (for example R) where the raster/vector is located in geographic space. </a:t>
+              <a:rPr lang="en-US" sz="1600" dirty="0"/>
+              <a:t>A raster can contain one or more bands. </a:t>
             </a:r>
           </a:p>
           <a:p>
@@ -3833,8 +3856,8 @@
               <a:buChar char="§"/>
             </a:pPr>
             <a:r>
-              <a:rPr lang="en-US" dirty="0"/>
-              <a:t>It also tells the mapping software what method (projection) should be used to flatten or project the raster in geographic space.</a:t>
+              <a:rPr lang="en-US" sz="1600" dirty="0"/>
+              <a:t>One type of multi-band raster dataset that is familiar to many of us is a color image. </a:t>
             </a:r>
           </a:p>
           <a:p>
@@ -3843,68 +3866,54 @@
               <a:buChar char="§"/>
             </a:pPr>
             <a:r>
-              <a:rPr lang="en-US" dirty="0"/>
-              <a:t>Key components of a CRS are: </a:t>
-            </a:r>
-          </a:p>
-          <a:p>
-            <a:pPr marL="662940" lvl="1" indent="-285750">
-              <a:buFont typeface="Wingdings" pitchFamily="2" charset="2"/>
-              <a:buChar char="§"/>
-            </a:pPr>
-            <a:r>
-              <a:rPr lang="en-US" dirty="0"/>
-              <a:t>Datum – a model of the shape of the earth (ex. WGS84, NAD83)</a:t>
-            </a:r>
-          </a:p>
-          <a:p>
-            <a:pPr marL="662940" lvl="1" indent="-285750">
-              <a:buFont typeface="Wingdings" pitchFamily="2" charset="2"/>
-              <a:buChar char="§"/>
-            </a:pPr>
-            <a:r>
-              <a:rPr lang="en-US" dirty="0"/>
-              <a:t>Projection – mathematical transform of angular measurements from spheroidal to flat.  May include a zonal information if UTM</a:t>
-            </a:r>
-          </a:p>
-          <a:p>
-            <a:pPr marL="662940" lvl="1" indent="-285750">
-              <a:buFont typeface="Wingdings" pitchFamily="2" charset="2"/>
-              <a:buChar char="§"/>
-            </a:pPr>
-            <a:r>
-              <a:rPr lang="en-US" dirty="0"/>
-              <a:t>Ellipsoid - </a:t>
-            </a:r>
-            <a:r>
-              <a:rPr lang="en-US" dirty="0">
-                <a:latin typeface="Arial" pitchFamily="-106" charset="0"/>
+              <a:rPr lang="en-US" sz="1600" dirty="0"/>
+              <a:t>A basic color image consists of three bands: </a:t>
+            </a:r>
+            <a:r>
+              <a:rPr lang="en-US" sz="1600" dirty="0">
+                <a:solidFill>
+                  <a:srgbClr val="FF0000"/>
+                </a:solidFill>
               </a:rPr>
-              <a:t>mathematical surface obtained by revolving an ellipse about the earth’s polar axis.  Selected to give a good fit to the geoid</a:t>
-            </a:r>
-          </a:p>
-          <a:p>
-            <a:pPr marL="662940" lvl="1" indent="-285750">
-              <a:buFont typeface="Wingdings" pitchFamily="2" charset="2"/>
-              <a:buChar char="§"/>
-            </a:pPr>
-            <a:endParaRPr lang="en-US" dirty="0"/>
-          </a:p>
-          <a:p>
-            <a:pPr marL="285750" indent="-285750">
-              <a:buFont typeface="Wingdings" pitchFamily="2" charset="2"/>
-              <a:buChar char="§"/>
-            </a:pPr>
-            <a:endParaRPr lang="en-US" dirty="0"/>
-          </a:p>
-        </p:txBody>
-      </p:sp>
-      <p:sp>
-        <p:nvSpPr>
-          <p:cNvPr id="7" name="Text Placeholder 2">
+              <a:t>red</a:t>
+            </a:r>
+            <a:r>
+              <a:rPr lang="en-US" sz="1600" dirty="0"/>
+              <a:t>, </a:t>
+            </a:r>
+            <a:r>
+              <a:rPr lang="en-US" sz="1600" dirty="0">
+                <a:solidFill>
+                  <a:srgbClr val="00B050"/>
+                </a:solidFill>
+              </a:rPr>
+              <a:t>green</a:t>
+            </a:r>
+            <a:r>
+              <a:rPr lang="en-US" sz="1600" dirty="0"/>
+              <a:t>, and </a:t>
+            </a:r>
+            <a:r>
+              <a:rPr lang="en-US" sz="1600" dirty="0">
+                <a:solidFill>
+                  <a:schemeClr val="tx2"/>
+                </a:solidFill>
+              </a:rPr>
+              <a:t>blue</a:t>
+            </a:r>
+            <a:r>
+              <a:rPr lang="en-US" sz="1600" dirty="0"/>
+              <a:t>. Each band represents light reflected from the red, green or blue portions of the electromagnetic spectrum.</a:t>
+            </a:r>
+          </a:p>
+        </p:txBody>
+      </p:sp>
+      <p:sp>
+        <p:nvSpPr>
+          <p:cNvPr id="14" name="Text Placeholder 2">
             <a:extLst>
               <a:ext uri="{FF2B5EF4-FFF2-40B4-BE49-F238E27FC236}">
-                <a16:creationId xmlns:a16="http://schemas.microsoft.com/office/drawing/2014/main" id="{43265DD6-B627-7242-B878-C522E951F70C}"/>
+                <a16:creationId xmlns:a16="http://schemas.microsoft.com/office/drawing/2014/main" id="{4395FFB7-0801-7740-8C8B-83CC9B00BAC3}"/>
               </a:ext>
             </a:extLst>
           </p:cNvPr>
@@ -3918,7 +3927,7 @@
         <p:spPr>
           <a:xfrm>
             <a:off x="337760" y="292626"/>
-            <a:ext cx="4234240" cy="279834"/>
+            <a:ext cx="4158040" cy="279834"/>
           </a:xfrm>
         </p:spPr>
         <p:txBody>
@@ -3927,7 +3936,7 @@
           <a:p>
             <a:r>
               <a:rPr lang="en-US" dirty="0"/>
-              <a:t>3. Intro to Geospatial Concepts - CRS</a:t>
+              <a:t>1. Intro to Geospatial Concepts - Raster</a:t>
             </a:r>
           </a:p>
         </p:txBody>
@@ -3935,7 +3944,7 @@
     </p:spTree>
     <p:extLst>
       <p:ext uri="{BB962C8B-B14F-4D97-AF65-F5344CB8AC3E}">
-        <p14:creationId xmlns:p14="http://schemas.microsoft.com/office/powerpoint/2010/main" val="2933779124"/>
+        <p14:creationId xmlns:p14="http://schemas.microsoft.com/office/powerpoint/2010/main" val="2074096631"/>
       </p:ext>
     </p:extLst>
   </p:cSld>
@@ -3992,6 +4001,113 @@
       </p:sp>
       <p:sp>
         <p:nvSpPr>
+          <p:cNvPr id="11" name="Text Placeholder 3">
+            <a:extLst>
+              <a:ext uri="{FF2B5EF4-FFF2-40B4-BE49-F238E27FC236}">
+                <a16:creationId xmlns:a16="http://schemas.microsoft.com/office/drawing/2014/main" id="{C25E8A40-1ADE-F146-ABBE-128C54E1C877}"/>
+              </a:ext>
+            </a:extLst>
+          </p:cNvPr>
+          <p:cNvSpPr>
+            <a:spLocks noGrp="1"/>
+          </p:cNvSpPr>
+          <p:nvPr>
+            <p:ph type="body" sz="quarter" idx="11"/>
+          </p:nvPr>
+        </p:nvSpPr>
+        <p:spPr>
+          <a:xfrm>
+            <a:off x="733997" y="1064298"/>
+            <a:ext cx="7423308" cy="2288381"/>
+          </a:xfrm>
+        </p:spPr>
+        <p:txBody>
+          <a:bodyPr/>
+          <a:lstStyle/>
+          <a:p>
+            <a:pPr marL="285750" indent="-285750">
+              <a:buFont typeface="Wingdings" pitchFamily="2" charset="2"/>
+              <a:buChar char="§"/>
+            </a:pPr>
+            <a:r>
+              <a:rPr lang="en-US" dirty="0"/>
+              <a:t>The CRS associated with a dataset tells your mapping software (for example R) where the raster/vector is located in geographic space. </a:t>
+            </a:r>
+          </a:p>
+          <a:p>
+            <a:pPr marL="285750" indent="-285750">
+              <a:buFont typeface="Wingdings" pitchFamily="2" charset="2"/>
+              <a:buChar char="§"/>
+            </a:pPr>
+            <a:r>
+              <a:rPr lang="en-US" dirty="0"/>
+              <a:t>It also tells the mapping software what method (projection) should be used to flatten or project the raster in geographic space.</a:t>
+            </a:r>
+          </a:p>
+          <a:p>
+            <a:pPr marL="285750" indent="-285750">
+              <a:buFont typeface="Wingdings" pitchFamily="2" charset="2"/>
+              <a:buChar char="§"/>
+            </a:pPr>
+            <a:r>
+              <a:rPr lang="en-US" dirty="0"/>
+              <a:t>Key components of a CRS are: </a:t>
+            </a:r>
+          </a:p>
+          <a:p>
+            <a:pPr marL="662940" lvl="1" indent="-285750">
+              <a:buFont typeface="Wingdings" pitchFamily="2" charset="2"/>
+              <a:buChar char="§"/>
+            </a:pPr>
+            <a:r>
+              <a:rPr lang="en-US" dirty="0"/>
+              <a:t>Datum – a model of the shape of the earth (ex. WGS84, NAD83)</a:t>
+            </a:r>
+          </a:p>
+          <a:p>
+            <a:pPr marL="662940" lvl="1" indent="-285750">
+              <a:buFont typeface="Wingdings" pitchFamily="2" charset="2"/>
+              <a:buChar char="§"/>
+            </a:pPr>
+            <a:r>
+              <a:rPr lang="en-US" dirty="0"/>
+              <a:t>Projection – mathematical transform of angular measurements from spheroidal to flat.  May include a zonal information if UTM</a:t>
+            </a:r>
+          </a:p>
+          <a:p>
+            <a:pPr marL="662940" lvl="1" indent="-285750">
+              <a:buFont typeface="Wingdings" pitchFamily="2" charset="2"/>
+              <a:buChar char="§"/>
+            </a:pPr>
+            <a:r>
+              <a:rPr lang="en-US" dirty="0"/>
+              <a:t>Ellipsoid - </a:t>
+            </a:r>
+            <a:r>
+              <a:rPr lang="en-US" dirty="0">
+                <a:latin typeface="Arial" pitchFamily="-106" charset="0"/>
+              </a:rPr>
+              <a:t>mathematical surface obtained by revolving an ellipse about the earth’s polar axis.  Selected to give a good fit to the geoid</a:t>
+            </a:r>
+          </a:p>
+          <a:p>
+            <a:pPr marL="662940" lvl="1" indent="-285750">
+              <a:buFont typeface="Wingdings" pitchFamily="2" charset="2"/>
+              <a:buChar char="§"/>
+            </a:pPr>
+            <a:endParaRPr lang="en-US" dirty="0"/>
+          </a:p>
+          <a:p>
+            <a:pPr marL="285750" indent="-285750">
+              <a:buFont typeface="Wingdings" pitchFamily="2" charset="2"/>
+              <a:buChar char="§"/>
+            </a:pPr>
+            <a:endParaRPr lang="en-US" dirty="0"/>
+          </a:p>
+        </p:txBody>
+      </p:sp>
+      <p:sp>
+        <p:nvSpPr>
           <p:cNvPr id="7" name="Text Placeholder 2">
             <a:extLst>
               <a:ext uri="{FF2B5EF4-FFF2-40B4-BE49-F238E27FC236}">
@@ -4023,293 +4139,16 @@
           </a:p>
         </p:txBody>
       </p:sp>
-      <p:sp>
-        <p:nvSpPr>
-          <p:cNvPr id="8" name="Text Box 2">
-            <a:extLst>
-              <a:ext uri="{FF2B5EF4-FFF2-40B4-BE49-F238E27FC236}">
-                <a16:creationId xmlns:a16="http://schemas.microsoft.com/office/drawing/2014/main" id="{67F99D5C-80CB-1A4B-BB5F-BABB1E97CF23}"/>
-              </a:ext>
-            </a:extLst>
-          </p:cNvPr>
-          <p:cNvSpPr txBox="1">
-            <a:spLocks noChangeArrowheads="1"/>
-          </p:cNvSpPr>
-          <p:nvPr/>
-        </p:nvSpPr>
-        <p:spPr bwMode="auto">
-          <a:xfrm>
-            <a:off x="337760" y="1264381"/>
-            <a:ext cx="3918216" cy="2569934"/>
-          </a:xfrm>
-          <a:prstGeom prst="rect">
-            <a:avLst/>
-          </a:prstGeom>
-          <a:noFill/>
-          <a:ln w="9525">
-            <a:noFill/>
-            <a:miter lim="800000"/>
-            <a:headEnd/>
-            <a:tailEnd/>
-          </a:ln>
-        </p:spPr>
-        <p:txBody>
-          <a:bodyPr wrap="square">
-            <a:prstTxWarp prst="textNoShape">
-              <a:avLst/>
-            </a:prstTxWarp>
-            <a:spAutoFit/>
-          </a:bodyPr>
-          <a:lstStyle/>
-          <a:p>
-            <a:pPr>
-              <a:spcBef>
-                <a:spcPct val="50000"/>
-              </a:spcBef>
-            </a:pPr>
-            <a:r>
-              <a:rPr lang="en-US" b="1" dirty="0">
-                <a:solidFill>
-                  <a:srgbClr val="6E6E6E"/>
-                </a:solidFill>
-                <a:latin typeface="Arial" pitchFamily="-106" charset="0"/>
-                <a:cs typeface="Helvetica"/>
-              </a:rPr>
-              <a:t>Map Projections: </a:t>
-            </a:r>
-            <a:r>
-              <a:rPr lang="en-US" dirty="0">
-                <a:solidFill>
-                  <a:srgbClr val="6E6E6E"/>
-                </a:solidFill>
-                <a:latin typeface="Arial" pitchFamily="-106" charset="0"/>
-                <a:cs typeface="Helvetica"/>
-              </a:rPr>
-              <a:t>to convert geodetic positions of a portion of the earth’s surface to plane rectangular coordinates, points are projected mathematically from the ellipsoid to some imaginary developable surface - plane that can be rolled out flat</a:t>
-            </a:r>
-          </a:p>
-          <a:p>
-            <a:pPr>
-              <a:spcBef>
-                <a:spcPct val="50000"/>
-              </a:spcBef>
-            </a:pPr>
-            <a:r>
-              <a:rPr lang="en-US" b="1" dirty="0">
-                <a:solidFill>
-                  <a:srgbClr val="6E6E6E"/>
-                </a:solidFill>
-                <a:latin typeface="Arial" pitchFamily="-106" charset="0"/>
-                <a:cs typeface="Helvetica"/>
-              </a:rPr>
-              <a:t>Coordinate Reference Systems: </a:t>
-            </a:r>
-            <a:r>
-              <a:rPr lang="en-US" dirty="0">
-                <a:solidFill>
-                  <a:srgbClr val="6E6E6E"/>
-                </a:solidFill>
-                <a:latin typeface="Arial" pitchFamily="-106" charset="0"/>
-                <a:cs typeface="Helvetica"/>
-              </a:rPr>
-              <a:t>quantitative coordinate systems - based on mathematical projection models, often a cartesian coordinate system (i.e. x, y axes) representing relative positions within a particular map projection</a:t>
-            </a:r>
-          </a:p>
-        </p:txBody>
-      </p:sp>
-      <p:pic>
-        <p:nvPicPr>
-          <p:cNvPr id="9" name="Picture 6" descr="http://www.rodsbot.com/images_maps_cache/222-map-assoc.jpg">
-            <a:extLst>
-              <a:ext uri="{FF2B5EF4-FFF2-40B4-BE49-F238E27FC236}">
-                <a16:creationId xmlns:a16="http://schemas.microsoft.com/office/drawing/2014/main" id="{8096C3E5-A230-F94F-9DD6-968680E26B8A}"/>
-              </a:ext>
-            </a:extLst>
-          </p:cNvPr>
-          <p:cNvPicPr>
-            <a:picLocks noChangeAspect="1" noChangeArrowheads="1"/>
-          </p:cNvPicPr>
-          <p:nvPr/>
-        </p:nvPicPr>
-        <p:blipFill>
-          <a:blip r:embed="rId2">
-            <a:extLst>
-              <a:ext uri="{28A0092B-C50C-407E-A947-70E740481C1C}">
-                <a14:useLocalDpi xmlns:a14="http://schemas.microsoft.com/office/drawing/2010/main" val="0"/>
-              </a:ext>
-            </a:extLst>
-          </a:blip>
-          <a:srcRect/>
-          <a:stretch>
-            <a:fillRect/>
-          </a:stretch>
-        </p:blipFill>
-        <p:spPr bwMode="auto">
-          <a:xfrm>
-            <a:off x="5006536" y="1319715"/>
-            <a:ext cx="3017519" cy="2514600"/>
-          </a:xfrm>
-          <a:prstGeom prst="rect">
-            <a:avLst/>
-          </a:prstGeom>
-          <a:noFill/>
-          <a:effectLst>
-            <a:innerShdw blurRad="114300">
-              <a:prstClr val="black"/>
-            </a:innerShdw>
-          </a:effectLst>
-          <a:extLst>
-            <a:ext uri="{909E8E84-426E-40DD-AFC4-6F175D3DCCD1}">
-              <a14:hiddenFill xmlns:a14="http://schemas.microsoft.com/office/drawing/2010/main">
-                <a:solidFill>
-                  <a:srgbClr val="FFFFFF"/>
-                </a:solidFill>
-              </a14:hiddenFill>
-            </a:ext>
-          </a:extLst>
-        </p:spPr>
-      </p:pic>
     </p:spTree>
     <p:extLst>
       <p:ext uri="{BB962C8B-B14F-4D97-AF65-F5344CB8AC3E}">
-        <p14:creationId xmlns:p14="http://schemas.microsoft.com/office/powerpoint/2010/main" val="3177195259"/>
+        <p14:creationId xmlns:p14="http://schemas.microsoft.com/office/powerpoint/2010/main" val="2933779124"/>
       </p:ext>
     </p:extLst>
   </p:cSld>
   <p:clrMapOvr>
     <a:masterClrMapping/>
   </p:clrMapOvr>
-  <p:timing>
-    <p:tnLst>
-      <p:par>
-        <p:cTn id="1" dur="indefinite" restart="never" nodeType="tmRoot">
-          <p:childTnLst>
-            <p:seq concurrent="1" nextAc="seek">
-              <p:cTn id="2" dur="indefinite" nodeType="mainSeq">
-                <p:childTnLst>
-                  <p:par>
-                    <p:cTn id="3" fill="hold">
-                      <p:stCondLst>
-                        <p:cond delay="indefinite"/>
-                      </p:stCondLst>
-                      <p:childTnLst>
-                        <p:par>
-                          <p:cTn id="4" fill="hold">
-                            <p:stCondLst>
-                              <p:cond delay="0"/>
-                            </p:stCondLst>
-                            <p:childTnLst>
-                              <p:par>
-                                <p:cTn id="5" presetID="1" presetClass="entr" presetSubtype="0" fill="hold" grpId="0" nodeType="clickEffect">
-                                  <p:stCondLst>
-                                    <p:cond delay="0"/>
-                                  </p:stCondLst>
-                                  <p:childTnLst>
-                                    <p:set>
-                                      <p:cBhvr>
-                                        <p:cTn id="6" dur="1" fill="hold">
-                                          <p:stCondLst>
-                                            <p:cond delay="499"/>
-                                          </p:stCondLst>
-                                        </p:cTn>
-                                        <p:tgtEl>
-                                          <p:spTgt spid="8">
-                                            <p:txEl>
-                                              <p:pRg st="0" end="0"/>
-                                            </p:txEl>
-                                          </p:spTgt>
-                                        </p:tgtEl>
-                                        <p:attrNameLst>
-                                          <p:attrName>style.visibility</p:attrName>
-                                        </p:attrNameLst>
-                                      </p:cBhvr>
-                                      <p:to>
-                                        <p:strVal val="visible"/>
-                                      </p:to>
-                                    </p:set>
-                                  </p:childTnLst>
-                                </p:cTn>
-                              </p:par>
-                            </p:childTnLst>
-                          </p:cTn>
-                        </p:par>
-                      </p:childTnLst>
-                    </p:cTn>
-                  </p:par>
-                  <p:par>
-                    <p:cTn id="7" fill="hold">
-                      <p:stCondLst>
-                        <p:cond delay="indefinite"/>
-                      </p:stCondLst>
-                      <p:childTnLst>
-                        <p:par>
-                          <p:cTn id="8" fill="hold">
-                            <p:stCondLst>
-                              <p:cond delay="0"/>
-                            </p:stCondLst>
-                            <p:childTnLst>
-                              <p:par>
-                                <p:cTn id="9" presetID="1" presetClass="entr" presetSubtype="0" fill="hold" grpId="0" nodeType="clickEffect">
-                                  <p:stCondLst>
-                                    <p:cond delay="0"/>
-                                  </p:stCondLst>
-                                  <p:childTnLst>
-                                    <p:set>
-                                      <p:cBhvr>
-                                        <p:cTn id="10" dur="1" fill="hold">
-                                          <p:stCondLst>
-                                            <p:cond delay="499"/>
-                                          </p:stCondLst>
-                                        </p:cTn>
-                                        <p:tgtEl>
-                                          <p:spTgt spid="8">
-                                            <p:txEl>
-                                              <p:pRg st="1" end="1"/>
-                                            </p:txEl>
-                                          </p:spTgt>
-                                        </p:tgtEl>
-                                        <p:attrNameLst>
-                                          <p:attrName>style.visibility</p:attrName>
-                                        </p:attrNameLst>
-                                      </p:cBhvr>
-                                      <p:to>
-                                        <p:strVal val="visible"/>
-                                      </p:to>
-                                    </p:set>
-                                  </p:childTnLst>
-                                </p:cTn>
-                              </p:par>
-                            </p:childTnLst>
-                          </p:cTn>
-                        </p:par>
-                      </p:childTnLst>
-                    </p:cTn>
-                  </p:par>
-                </p:childTnLst>
-              </p:cTn>
-              <p:prevCondLst>
-                <p:cond evt="onPrev" delay="0">
-                  <p:tgtEl>
-                    <p:sldTgt/>
-                  </p:tgtEl>
-                </p:cond>
-              </p:prevCondLst>
-              <p:nextCondLst>
-                <p:cond evt="onNext" delay="0">
-                  <p:tgtEl>
-                    <p:sldTgt/>
-                  </p:tgtEl>
-                </p:cond>
-              </p:nextCondLst>
-            </p:seq>
-          </p:childTnLst>
-        </p:cTn>
-      </p:par>
-    </p:tnLst>
-    <p:bldLst>
-      <p:bldP spid="8" grpId="0" build="p" autoUpdateAnimBg="0"/>
-    </p:bldLst>
-  </p:timing>
 </p:sld>
 </file>
 
@@ -4487,10 +4326,10 @@
       </p:sp>
       <p:pic>
         <p:nvPicPr>
-          <p:cNvPr id="6" name="Picture 2" descr="http://image.slidesharecdn.com/projectionsandcoordinatesystem-150316020116-conversion-gate01/95/projections-and-coordinate-system-27-638.jpg?cb=1426593529">
+          <p:cNvPr id="9" name="Picture 6" descr="http://www.rodsbot.com/images_maps_cache/222-map-assoc.jpg">
             <a:extLst>
               <a:ext uri="{FF2B5EF4-FFF2-40B4-BE49-F238E27FC236}">
-                <a16:creationId xmlns:a16="http://schemas.microsoft.com/office/drawing/2014/main" id="{BE7DE059-C34B-474E-8043-B95DF4DF774D}"/>
+                <a16:creationId xmlns:a16="http://schemas.microsoft.com/office/drawing/2014/main" id="{8096C3E5-A230-F94F-9DD6-968680E26B8A}"/>
               </a:ext>
             </a:extLst>
           </p:cNvPr>
@@ -4514,13 +4353,18 @@
         </p:blipFill>
         <p:spPr bwMode="auto">
           <a:xfrm>
-            <a:off x="4753527" y="1156755"/>
-            <a:ext cx="3662340" cy="2829990"/>
+            <a:off x="5006536" y="1319715"/>
+            <a:ext cx="3017519" cy="2514600"/>
           </a:xfrm>
           <a:prstGeom prst="rect">
             <a:avLst/>
           </a:prstGeom>
           <a:noFill/>
+          <a:effectLst>
+            <a:innerShdw blurRad="114300">
+              <a:prstClr val="black"/>
+            </a:innerShdw>
+          </a:effectLst>
           <a:extLst>
             <a:ext uri="{909E8E84-426E-40DD-AFC4-6F175D3DCCD1}">
               <a14:hiddenFill xmlns:a14="http://schemas.microsoft.com/office/drawing/2010/main">
@@ -4535,7 +4379,7 @@
     </p:spTree>
     <p:extLst>
       <p:ext uri="{BB962C8B-B14F-4D97-AF65-F5344CB8AC3E}">
-        <p14:creationId xmlns:p14="http://schemas.microsoft.com/office/powerpoint/2010/main" val="2949758957"/>
+        <p14:creationId xmlns:p14="http://schemas.microsoft.com/office/powerpoint/2010/main" val="3177195259"/>
       </p:ext>
     </p:extLst>
   </p:cSld>
@@ -4756,6 +4600,369 @@
       </p:sp>
       <p:sp>
         <p:nvSpPr>
+          <p:cNvPr id="8" name="Text Box 2">
+            <a:extLst>
+              <a:ext uri="{FF2B5EF4-FFF2-40B4-BE49-F238E27FC236}">
+                <a16:creationId xmlns:a16="http://schemas.microsoft.com/office/drawing/2014/main" id="{67F99D5C-80CB-1A4B-BB5F-BABB1E97CF23}"/>
+              </a:ext>
+            </a:extLst>
+          </p:cNvPr>
+          <p:cNvSpPr txBox="1">
+            <a:spLocks noChangeArrowheads="1"/>
+          </p:cNvSpPr>
+          <p:nvPr/>
+        </p:nvSpPr>
+        <p:spPr bwMode="auto">
+          <a:xfrm>
+            <a:off x="337760" y="1264381"/>
+            <a:ext cx="3918216" cy="2569934"/>
+          </a:xfrm>
+          <a:prstGeom prst="rect">
+            <a:avLst/>
+          </a:prstGeom>
+          <a:noFill/>
+          <a:ln w="9525">
+            <a:noFill/>
+            <a:miter lim="800000"/>
+            <a:headEnd/>
+            <a:tailEnd/>
+          </a:ln>
+        </p:spPr>
+        <p:txBody>
+          <a:bodyPr wrap="square">
+            <a:prstTxWarp prst="textNoShape">
+              <a:avLst/>
+            </a:prstTxWarp>
+            <a:spAutoFit/>
+          </a:bodyPr>
+          <a:lstStyle/>
+          <a:p>
+            <a:pPr>
+              <a:spcBef>
+                <a:spcPct val="50000"/>
+              </a:spcBef>
+            </a:pPr>
+            <a:r>
+              <a:rPr lang="en-US" b="1" dirty="0">
+                <a:solidFill>
+                  <a:srgbClr val="6E6E6E"/>
+                </a:solidFill>
+                <a:latin typeface="Arial" pitchFamily="-106" charset="0"/>
+                <a:cs typeface="Helvetica"/>
+              </a:rPr>
+              <a:t>Map Projections: </a:t>
+            </a:r>
+            <a:r>
+              <a:rPr lang="en-US" dirty="0">
+                <a:solidFill>
+                  <a:srgbClr val="6E6E6E"/>
+                </a:solidFill>
+                <a:latin typeface="Arial" pitchFamily="-106" charset="0"/>
+                <a:cs typeface="Helvetica"/>
+              </a:rPr>
+              <a:t>to convert geodetic positions of a portion of the earth’s surface to plane rectangular coordinates, points are projected mathematically from the ellipsoid to some imaginary developable surface - plane that can be rolled out flat</a:t>
+            </a:r>
+          </a:p>
+          <a:p>
+            <a:pPr>
+              <a:spcBef>
+                <a:spcPct val="50000"/>
+              </a:spcBef>
+            </a:pPr>
+            <a:r>
+              <a:rPr lang="en-US" b="1" dirty="0">
+                <a:solidFill>
+                  <a:srgbClr val="6E6E6E"/>
+                </a:solidFill>
+                <a:latin typeface="Arial" pitchFamily="-106" charset="0"/>
+                <a:cs typeface="Helvetica"/>
+              </a:rPr>
+              <a:t>Coordinate Reference Systems: </a:t>
+            </a:r>
+            <a:r>
+              <a:rPr lang="en-US" dirty="0">
+                <a:solidFill>
+                  <a:srgbClr val="6E6E6E"/>
+                </a:solidFill>
+                <a:latin typeface="Arial" pitchFamily="-106" charset="0"/>
+                <a:cs typeface="Helvetica"/>
+              </a:rPr>
+              <a:t>quantitative coordinate systems - based on mathematical projection models, often a cartesian coordinate system (i.e. x, y axes) representing relative positions within a particular map projection</a:t>
+            </a:r>
+          </a:p>
+        </p:txBody>
+      </p:sp>
+      <p:pic>
+        <p:nvPicPr>
+          <p:cNvPr id="6" name="Picture 2" descr="http://image.slidesharecdn.com/projectionsandcoordinatesystem-150316020116-conversion-gate01/95/projections-and-coordinate-system-27-638.jpg?cb=1426593529">
+            <a:extLst>
+              <a:ext uri="{FF2B5EF4-FFF2-40B4-BE49-F238E27FC236}">
+                <a16:creationId xmlns:a16="http://schemas.microsoft.com/office/drawing/2014/main" id="{BE7DE059-C34B-474E-8043-B95DF4DF774D}"/>
+              </a:ext>
+            </a:extLst>
+          </p:cNvPr>
+          <p:cNvPicPr>
+            <a:picLocks noChangeAspect="1" noChangeArrowheads="1"/>
+          </p:cNvPicPr>
+          <p:nvPr/>
+        </p:nvPicPr>
+        <p:blipFill>
+          <a:blip r:embed="rId2">
+            <a:extLst>
+              <a:ext uri="{28A0092B-C50C-407E-A947-70E740481C1C}">
+                <a14:useLocalDpi xmlns:a14="http://schemas.microsoft.com/office/drawing/2010/main" val="0"/>
+              </a:ext>
+            </a:extLst>
+          </a:blip>
+          <a:srcRect/>
+          <a:stretch>
+            <a:fillRect/>
+          </a:stretch>
+        </p:blipFill>
+        <p:spPr bwMode="auto">
+          <a:xfrm>
+            <a:off x="4753527" y="1156755"/>
+            <a:ext cx="3662340" cy="2829990"/>
+          </a:xfrm>
+          <a:prstGeom prst="rect">
+            <a:avLst/>
+          </a:prstGeom>
+          <a:noFill/>
+          <a:extLst>
+            <a:ext uri="{909E8E84-426E-40DD-AFC4-6F175D3DCCD1}">
+              <a14:hiddenFill xmlns:a14="http://schemas.microsoft.com/office/drawing/2010/main">
+                <a:solidFill>
+                  <a:srgbClr val="FFFFFF"/>
+                </a:solidFill>
+              </a14:hiddenFill>
+            </a:ext>
+          </a:extLst>
+        </p:spPr>
+      </p:pic>
+    </p:spTree>
+    <p:extLst>
+      <p:ext uri="{BB962C8B-B14F-4D97-AF65-F5344CB8AC3E}">
+        <p14:creationId xmlns:p14="http://schemas.microsoft.com/office/powerpoint/2010/main" val="2949758957"/>
+      </p:ext>
+    </p:extLst>
+  </p:cSld>
+  <p:clrMapOvr>
+    <a:masterClrMapping/>
+  </p:clrMapOvr>
+  <p:timing>
+    <p:tnLst>
+      <p:par>
+        <p:cTn id="1" dur="indefinite" restart="never" nodeType="tmRoot">
+          <p:childTnLst>
+            <p:seq concurrent="1" nextAc="seek">
+              <p:cTn id="2" dur="indefinite" nodeType="mainSeq">
+                <p:childTnLst>
+                  <p:par>
+                    <p:cTn id="3" fill="hold">
+                      <p:stCondLst>
+                        <p:cond delay="indefinite"/>
+                      </p:stCondLst>
+                      <p:childTnLst>
+                        <p:par>
+                          <p:cTn id="4" fill="hold">
+                            <p:stCondLst>
+                              <p:cond delay="0"/>
+                            </p:stCondLst>
+                            <p:childTnLst>
+                              <p:par>
+                                <p:cTn id="5" presetID="1" presetClass="entr" presetSubtype="0" fill="hold" grpId="0" nodeType="clickEffect">
+                                  <p:stCondLst>
+                                    <p:cond delay="0"/>
+                                  </p:stCondLst>
+                                  <p:childTnLst>
+                                    <p:set>
+                                      <p:cBhvr>
+                                        <p:cTn id="6" dur="1" fill="hold">
+                                          <p:stCondLst>
+                                            <p:cond delay="499"/>
+                                          </p:stCondLst>
+                                        </p:cTn>
+                                        <p:tgtEl>
+                                          <p:spTgt spid="8">
+                                            <p:txEl>
+                                              <p:pRg st="0" end="0"/>
+                                            </p:txEl>
+                                          </p:spTgt>
+                                        </p:tgtEl>
+                                        <p:attrNameLst>
+                                          <p:attrName>style.visibility</p:attrName>
+                                        </p:attrNameLst>
+                                      </p:cBhvr>
+                                      <p:to>
+                                        <p:strVal val="visible"/>
+                                      </p:to>
+                                    </p:set>
+                                  </p:childTnLst>
+                                </p:cTn>
+                              </p:par>
+                            </p:childTnLst>
+                          </p:cTn>
+                        </p:par>
+                      </p:childTnLst>
+                    </p:cTn>
+                  </p:par>
+                  <p:par>
+                    <p:cTn id="7" fill="hold">
+                      <p:stCondLst>
+                        <p:cond delay="indefinite"/>
+                      </p:stCondLst>
+                      <p:childTnLst>
+                        <p:par>
+                          <p:cTn id="8" fill="hold">
+                            <p:stCondLst>
+                              <p:cond delay="0"/>
+                            </p:stCondLst>
+                            <p:childTnLst>
+                              <p:par>
+                                <p:cTn id="9" presetID="1" presetClass="entr" presetSubtype="0" fill="hold" grpId="0" nodeType="clickEffect">
+                                  <p:stCondLst>
+                                    <p:cond delay="0"/>
+                                  </p:stCondLst>
+                                  <p:childTnLst>
+                                    <p:set>
+                                      <p:cBhvr>
+                                        <p:cTn id="10" dur="1" fill="hold">
+                                          <p:stCondLst>
+                                            <p:cond delay="499"/>
+                                          </p:stCondLst>
+                                        </p:cTn>
+                                        <p:tgtEl>
+                                          <p:spTgt spid="8">
+                                            <p:txEl>
+                                              <p:pRg st="1" end="1"/>
+                                            </p:txEl>
+                                          </p:spTgt>
+                                        </p:tgtEl>
+                                        <p:attrNameLst>
+                                          <p:attrName>style.visibility</p:attrName>
+                                        </p:attrNameLst>
+                                      </p:cBhvr>
+                                      <p:to>
+                                        <p:strVal val="visible"/>
+                                      </p:to>
+                                    </p:set>
+                                  </p:childTnLst>
+                                </p:cTn>
+                              </p:par>
+                            </p:childTnLst>
+                          </p:cTn>
+                        </p:par>
+                      </p:childTnLst>
+                    </p:cTn>
+                  </p:par>
+                </p:childTnLst>
+              </p:cTn>
+              <p:prevCondLst>
+                <p:cond evt="onPrev" delay="0">
+                  <p:tgtEl>
+                    <p:sldTgt/>
+                  </p:tgtEl>
+                </p:cond>
+              </p:prevCondLst>
+              <p:nextCondLst>
+                <p:cond evt="onNext" delay="0">
+                  <p:tgtEl>
+                    <p:sldTgt/>
+                  </p:tgtEl>
+                </p:cond>
+              </p:nextCondLst>
+            </p:seq>
+          </p:childTnLst>
+        </p:cTn>
+      </p:par>
+    </p:tnLst>
+    <p:bldLst>
+      <p:bldP spid="8" grpId="0" build="p" autoUpdateAnimBg="0"/>
+    </p:bldLst>
+  </p:timing>
+</p:sld>
+</file>
+
+<file path=ppt/slides/slide19.xml><?xml version="1.0" encoding="utf-8"?>
+<p:sld xmlns:a="http://schemas.openxmlformats.org/drawingml/2006/main" xmlns:r="http://schemas.openxmlformats.org/officeDocument/2006/relationships" xmlns:p="http://schemas.openxmlformats.org/presentationml/2006/main">
+  <p:cSld>
+    <p:spTree>
+      <p:nvGrpSpPr>
+        <p:cNvPr id="1" name=""/>
+        <p:cNvGrpSpPr/>
+        <p:nvPr/>
+      </p:nvGrpSpPr>
+      <p:grpSpPr>
+        <a:xfrm>
+          <a:off x="0" y="0"/>
+          <a:ext cx="0" cy="0"/>
+          <a:chOff x="0" y="0"/>
+          <a:chExt cx="0" cy="0"/>
+        </a:xfrm>
+      </p:grpSpPr>
+      <p:sp>
+        <p:nvSpPr>
+          <p:cNvPr id="2" name="Title 1">
+            <a:extLst>
+              <a:ext uri="{FF2B5EF4-FFF2-40B4-BE49-F238E27FC236}">
+                <a16:creationId xmlns:a16="http://schemas.microsoft.com/office/drawing/2014/main" id="{012322C8-7E00-364B-ADFB-9F14A7CD7D58}"/>
+              </a:ext>
+            </a:extLst>
+          </p:cNvPr>
+          <p:cNvSpPr>
+            <a:spLocks noGrp="1"/>
+          </p:cNvSpPr>
+          <p:nvPr>
+            <p:ph type="title"/>
+          </p:nvPr>
+        </p:nvSpPr>
+        <p:spPr/>
+        <p:txBody>
+          <a:bodyPr/>
+          <a:lstStyle/>
+          <a:p>
+            <a:r>
+              <a:rPr lang="en-US" dirty="0"/>
+              <a:t>Coordinate Reference Systems</a:t>
+            </a:r>
+          </a:p>
+        </p:txBody>
+      </p:sp>
+      <p:sp>
+        <p:nvSpPr>
+          <p:cNvPr id="7" name="Text Placeholder 2">
+            <a:extLst>
+              <a:ext uri="{FF2B5EF4-FFF2-40B4-BE49-F238E27FC236}">
+                <a16:creationId xmlns:a16="http://schemas.microsoft.com/office/drawing/2014/main" id="{43265DD6-B627-7242-B878-C522E951F70C}"/>
+              </a:ext>
+            </a:extLst>
+          </p:cNvPr>
+          <p:cNvSpPr>
+            <a:spLocks noGrp="1"/>
+          </p:cNvSpPr>
+          <p:nvPr>
+            <p:ph type="body" sz="quarter" idx="10"/>
+          </p:nvPr>
+        </p:nvSpPr>
+        <p:spPr>
+          <a:xfrm>
+            <a:off x="337760" y="292626"/>
+            <a:ext cx="4234240" cy="279834"/>
+          </a:xfrm>
+        </p:spPr>
+        <p:txBody>
+          <a:bodyPr/>
+          <a:lstStyle/>
+          <a:p>
+            <a:r>
+              <a:rPr lang="en-US" dirty="0"/>
+              <a:t>3. Intro to Geospatial Concepts - CRS</a:t>
+            </a:r>
+          </a:p>
+        </p:txBody>
+      </p:sp>
+      <p:sp>
+        <p:nvSpPr>
           <p:cNvPr id="3" name="Rectangle 2">
             <a:extLst>
               <a:ext uri="{FF2B5EF4-FFF2-40B4-BE49-F238E27FC236}">
@@ -6071,7 +6278,7 @@
           <p:cNvPr id="2" name="Title 1">
             <a:extLst>
               <a:ext uri="{FF2B5EF4-FFF2-40B4-BE49-F238E27FC236}">
-                <a16:creationId xmlns:a16="http://schemas.microsoft.com/office/drawing/2014/main" id="{F09CD2E8-75D0-4A48-AC4A-0C5A28DE906A}"/>
+                <a16:creationId xmlns:a16="http://schemas.microsoft.com/office/drawing/2014/main" id="{916FBA9E-B6AF-3E4D-9FE6-3523B3BA4F8A}"/>
               </a:ext>
             </a:extLst>
           </p:cNvPr>
@@ -6087,10 +6294,32 @@
           <a:bodyPr/>
           <a:lstStyle/>
           <a:p>
-            <a:r>
-              <a:rPr lang="en-US" dirty="0"/>
-              <a:t>Introduction to Raster data</a:t>
-            </a:r>
+            <a:endParaRPr lang="en-US"/>
+          </a:p>
+        </p:txBody>
+      </p:sp>
+      <p:sp>
+        <p:nvSpPr>
+          <p:cNvPr id="3" name="Text Placeholder 2">
+            <a:extLst>
+              <a:ext uri="{FF2B5EF4-FFF2-40B4-BE49-F238E27FC236}">
+                <a16:creationId xmlns:a16="http://schemas.microsoft.com/office/drawing/2014/main" id="{7072B3D5-2CAB-624B-B099-403A375FA8F3}"/>
+              </a:ext>
+            </a:extLst>
+          </p:cNvPr>
+          <p:cNvSpPr>
+            <a:spLocks noGrp="1"/>
+          </p:cNvSpPr>
+          <p:nvPr>
+            <p:ph type="body" sz="quarter" idx="10"/>
+          </p:nvPr>
+        </p:nvSpPr>
+        <p:spPr/>
+        <p:txBody>
+          <a:bodyPr/>
+          <a:lstStyle/>
+          <a:p>
+            <a:endParaRPr lang="en-US"/>
           </a:p>
         </p:txBody>
       </p:sp>
@@ -6099,7 +6328,7 @@
           <p:cNvPr id="4" name="Text Placeholder 3">
             <a:extLst>
               <a:ext uri="{FF2B5EF4-FFF2-40B4-BE49-F238E27FC236}">
-                <a16:creationId xmlns:a16="http://schemas.microsoft.com/office/drawing/2014/main" id="{303692FC-AA04-5449-B181-12607485A379}"/>
+                <a16:creationId xmlns:a16="http://schemas.microsoft.com/office/drawing/2014/main" id="{56F43C5B-22E2-064F-9B9C-F3F6F67759E3}"/>
               </a:ext>
             </a:extLst>
           </p:cNvPr>
@@ -6113,133 +6342,44 @@
         <p:spPr>
           <a:xfrm>
             <a:off x="374493" y="1339135"/>
-            <a:ext cx="5179640" cy="2288381"/>
+            <a:ext cx="8229600" cy="2288381"/>
           </a:xfrm>
         </p:spPr>
         <p:txBody>
           <a:bodyPr/>
           <a:lstStyle/>
           <a:p>
-            <a:pPr marL="285750" indent="-285750">
-              <a:buFont typeface="Wingdings" pitchFamily="2" charset="2"/>
-              <a:buChar char="§"/>
-            </a:pPr>
-            <a:r>
-              <a:rPr lang="en-US" dirty="0"/>
-              <a:t>The two primary types of geospatial data are </a:t>
-            </a:r>
-            <a:r>
-              <a:rPr lang="en-US" b="1" dirty="0"/>
-              <a:t>raster</a:t>
-            </a:r>
-            <a:r>
-              <a:rPr lang="en-US" dirty="0"/>
-              <a:t> and </a:t>
-            </a:r>
-            <a:r>
-              <a:rPr lang="en-US" b="1" dirty="0"/>
-              <a:t>vector</a:t>
-            </a:r>
-            <a:r>
-              <a:rPr lang="en-US" dirty="0"/>
-              <a:t> data. </a:t>
-            </a:r>
-          </a:p>
-          <a:p>
-            <a:pPr marL="285750" indent="-285750">
-              <a:buFont typeface="Wingdings" pitchFamily="2" charset="2"/>
-              <a:buChar char="§"/>
-            </a:pPr>
-            <a:r>
-              <a:rPr lang="en-US" dirty="0"/>
-              <a:t>Raster data is stored as a grid of values which are rendered on a map as pixels. Each pixel value represents an area on the Earth’s surface. </a:t>
-            </a:r>
-          </a:p>
-          <a:p>
-            <a:pPr marL="285750" indent="-285750">
-              <a:buFont typeface="Wingdings" pitchFamily="2" charset="2"/>
-              <a:buChar char="§"/>
-            </a:pPr>
-            <a:r>
-              <a:rPr lang="en-US" dirty="0"/>
-              <a:t>Vector data structures represent specific features on the Earth’s surface and assign attributes to those features.</a:t>
-            </a:r>
-          </a:p>
-        </p:txBody>
-      </p:sp>
-      <p:pic>
-        <p:nvPicPr>
-          <p:cNvPr id="7" name="Picture 6" descr="A screenshot of a cell phone&#10;&#10;Description automatically generated">
-            <a:extLst>
-              <a:ext uri="{FF2B5EF4-FFF2-40B4-BE49-F238E27FC236}">
-                <a16:creationId xmlns:a16="http://schemas.microsoft.com/office/drawing/2014/main" id="{D4F6DBE4-30A2-8D48-A005-63D093E77EE0}"/>
-              </a:ext>
-            </a:extLst>
-          </p:cNvPr>
-          <p:cNvPicPr>
-            <a:picLocks noChangeAspect="1"/>
-          </p:cNvPicPr>
-          <p:nvPr/>
-        </p:nvPicPr>
-        <p:blipFill>
-          <a:blip r:embed="rId2">
-            <a:extLst>
-              <a:ext uri="{28A0092B-C50C-407E-A947-70E740481C1C}">
-                <a14:useLocalDpi xmlns:a14="http://schemas.microsoft.com/office/drawing/2010/main" val="0"/>
-              </a:ext>
-            </a:extLst>
-          </a:blip>
-          <a:stretch>
-            <a:fillRect/>
-          </a:stretch>
-        </p:blipFill>
-        <p:spPr>
-          <a:xfrm>
-            <a:off x="5698001" y="1130300"/>
-            <a:ext cx="2981570" cy="2882900"/>
-          </a:xfrm>
-          <a:prstGeom prst="rect">
-            <a:avLst/>
-          </a:prstGeom>
-        </p:spPr>
-      </p:pic>
-      <p:sp>
-        <p:nvSpPr>
-          <p:cNvPr id="10" name="Text Placeholder 2">
-            <a:extLst>
-              <a:ext uri="{FF2B5EF4-FFF2-40B4-BE49-F238E27FC236}">
-                <a16:creationId xmlns:a16="http://schemas.microsoft.com/office/drawing/2014/main" id="{4B84E5FB-E22E-914D-99A1-FC6C5B50F73A}"/>
-              </a:ext>
-            </a:extLst>
-          </p:cNvPr>
-          <p:cNvSpPr>
-            <a:spLocks noGrp="1"/>
-          </p:cNvSpPr>
-          <p:nvPr>
-            <p:ph type="body" sz="quarter" idx="10"/>
-          </p:nvPr>
-        </p:nvSpPr>
-        <p:spPr>
-          <a:xfrm>
-            <a:off x="337760" y="292626"/>
-            <a:ext cx="4234240" cy="279834"/>
-          </a:xfrm>
-        </p:spPr>
-        <p:txBody>
-          <a:bodyPr/>
-          <a:lstStyle/>
-          <a:p>
-            <a:r>
-              <a:rPr lang="en-US" dirty="0"/>
-              <a:t>1. Intro to Geospatial Concepts - Raster</a:t>
-            </a:r>
+            <a:r>
+              <a:rPr lang="en-US" dirty="0"/>
+              <a:t>Data download if you have an issue with </a:t>
+            </a:r>
+            <a:r>
+              <a:rPr lang="en-US" dirty="0" err="1"/>
+              <a:t>github</a:t>
+            </a:r>
+            <a:r>
+              <a:rPr lang="en-US" dirty="0"/>
+              <a:t>: </a:t>
+            </a:r>
+          </a:p>
+          <a:p>
+            <a:r>
+              <a:rPr lang="en-US" dirty="0">
+                <a:hlinkClick r:id="rId2"/>
+              </a:rPr>
+              <a:t>https://drive.google.com/file/d/1gm2aWOFBUSC6FiBcXN2WRCA--6eq5_ZG/view?usp=sharing</a:t>
+            </a:r>
+            <a:endParaRPr lang="en-US" dirty="0"/>
+          </a:p>
+          <a:p>
+            <a:endParaRPr lang="en-US" dirty="0"/>
           </a:p>
         </p:txBody>
       </p:sp>
     </p:spTree>
     <p:extLst>
       <p:ext uri="{BB962C8B-B14F-4D97-AF65-F5344CB8AC3E}">
-        <p14:creationId xmlns:p14="http://schemas.microsoft.com/office/powerpoint/2010/main" val="1549300447"/>
+        <p14:creationId xmlns:p14="http://schemas.microsoft.com/office/powerpoint/2010/main" val="599067798"/>
       </p:ext>
     </p:extLst>
   </p:cSld>
@@ -6313,7 +6453,7 @@
         <p:spPr>
           <a:xfrm>
             <a:off x="374493" y="1339135"/>
-            <a:ext cx="5221974" cy="2288381"/>
+            <a:ext cx="5179640" cy="2288381"/>
           </a:xfrm>
         </p:spPr>
         <p:txBody>
@@ -6325,8 +6465,24 @@
               <a:buChar char="§"/>
             </a:pPr>
             <a:r>
-              <a:rPr lang="en-US" sz="1600" dirty="0"/>
-              <a:t>Raster data is any pixelated (or gridded) data where each pixel is associated with a specific geographical location. </a:t>
+              <a:rPr lang="en-US" dirty="0"/>
+              <a:t>The two primary types of geospatial data are </a:t>
+            </a:r>
+            <a:r>
+              <a:rPr lang="en-US" b="1" dirty="0"/>
+              <a:t>raster</a:t>
+            </a:r>
+            <a:r>
+              <a:rPr lang="en-US" dirty="0"/>
+              <a:t> and </a:t>
+            </a:r>
+            <a:r>
+              <a:rPr lang="en-US" b="1" dirty="0"/>
+              <a:t>vector</a:t>
+            </a:r>
+            <a:r>
+              <a:rPr lang="en-US" dirty="0"/>
+              <a:t> data. </a:t>
             </a:r>
           </a:p>
           <a:p>
@@ -6335,8 +6491,18 @@
               <a:buChar char="§"/>
             </a:pPr>
             <a:r>
-              <a:rPr lang="en-US" sz="1600" dirty="0"/>
-              <a:t>The value of a pixel can be continuous (e.g. elevation) or categorical (e.g. land use). </a:t>
+              <a:rPr lang="en-US" dirty="0"/>
+              <a:t>Raster data is stored as a grid of values which are rendered on a map as pixels. Each pixel value represents an area on the Earth’s surface. </a:t>
+            </a:r>
+          </a:p>
+          <a:p>
+            <a:pPr marL="285750" indent="-285750">
+              <a:buFont typeface="Wingdings" pitchFamily="2" charset="2"/>
+              <a:buChar char="§"/>
+            </a:pPr>
+            <a:r>
+              <a:rPr lang="en-US" dirty="0"/>
+              <a:t>Vector data structures represent specific features on the Earth’s surface and assign attributes to those features.</a:t>
             </a:r>
           </a:p>
         </p:txBody>
@@ -6379,10 +6545,10 @@
       </p:pic>
       <p:sp>
         <p:nvSpPr>
-          <p:cNvPr id="12" name="Text Placeholder 2">
+          <p:cNvPr id="10" name="Text Placeholder 2">
             <a:extLst>
               <a:ext uri="{FF2B5EF4-FFF2-40B4-BE49-F238E27FC236}">
-                <a16:creationId xmlns:a16="http://schemas.microsoft.com/office/drawing/2014/main" id="{84D092B1-4674-6849-B054-0DE45D6CAC33}"/>
+                <a16:creationId xmlns:a16="http://schemas.microsoft.com/office/drawing/2014/main" id="{4B84E5FB-E22E-914D-99A1-FC6C5B50F73A}"/>
               </a:ext>
             </a:extLst>
           </p:cNvPr>
@@ -6413,7 +6579,7 @@
     </p:spTree>
     <p:extLst>
       <p:ext uri="{BB962C8B-B14F-4D97-AF65-F5344CB8AC3E}">
-        <p14:creationId xmlns:p14="http://schemas.microsoft.com/office/powerpoint/2010/main" val="3381454128"/>
+        <p14:creationId xmlns:p14="http://schemas.microsoft.com/office/powerpoint/2010/main" val="1549300447"/>
       </p:ext>
     </p:extLst>
   </p:cSld>
@@ -6500,7 +6666,7 @@
             </a:pPr>
             <a:r>
               <a:rPr lang="en-US" sz="1600" dirty="0"/>
-              <a:t>A geospatial raster is only different from a digital photo in that it is accompanied by spatial information that connects the data to a particular location. </a:t>
+              <a:t>Raster data is any pixelated (or gridded) data where each pixel is associated with a specific geographical location. </a:t>
             </a:r>
           </a:p>
           <a:p>
@@ -6510,39 +6676,7 @@
             </a:pPr>
             <a:r>
               <a:rPr lang="en-US" sz="1600" dirty="0"/>
-              <a:t>This includes items such as a raster’s </a:t>
-            </a:r>
-            <a:r>
-              <a:rPr lang="en-US" sz="1600" b="1" dirty="0"/>
-              <a:t>extent</a:t>
-            </a:r>
-            <a:r>
-              <a:rPr lang="en-US" sz="1600" dirty="0"/>
-              <a:t> and </a:t>
-            </a:r>
-            <a:r>
-              <a:rPr lang="en-US" sz="1600" b="1" dirty="0"/>
-              <a:t>cell size</a:t>
-            </a:r>
-            <a:r>
-              <a:rPr lang="en-US" sz="1600" dirty="0"/>
-              <a:t>, the number of rows and columns, its </a:t>
-            </a:r>
-            <a:r>
-              <a:rPr lang="en-US" sz="1600" b="1" dirty="0"/>
-              <a:t>projection</a:t>
-            </a:r>
-            <a:r>
-              <a:rPr lang="en-US" sz="1600" dirty="0"/>
-              <a:t> and </a:t>
-            </a:r>
-            <a:r>
-              <a:rPr lang="en-US" sz="1600" b="1" dirty="0"/>
-              <a:t>coordinate reference system (or CRS), </a:t>
-            </a:r>
-            <a:r>
-              <a:rPr lang="en-US" sz="1600" dirty="0"/>
-              <a:t>as well as any associated attribute information.</a:t>
+              <a:t>The value of a pixel can be continuous (e.g. elevation) or categorical (e.g. land use). </a:t>
             </a:r>
           </a:p>
         </p:txBody>
@@ -6585,10 +6719,10 @@
       </p:pic>
       <p:sp>
         <p:nvSpPr>
-          <p:cNvPr id="11" name="Text Placeholder 2">
+          <p:cNvPr id="12" name="Text Placeholder 2">
             <a:extLst>
               <a:ext uri="{FF2B5EF4-FFF2-40B4-BE49-F238E27FC236}">
-                <a16:creationId xmlns:a16="http://schemas.microsoft.com/office/drawing/2014/main" id="{F8B84098-D64F-854C-A503-8C58441AADCC}"/>
+                <a16:creationId xmlns:a16="http://schemas.microsoft.com/office/drawing/2014/main" id="{84D092B1-4674-6849-B054-0DE45D6CAC33}"/>
               </a:ext>
             </a:extLst>
           </p:cNvPr>
@@ -6619,7 +6753,7 @@
     </p:spTree>
     <p:extLst>
       <p:ext uri="{BB962C8B-B14F-4D97-AF65-F5344CB8AC3E}">
-        <p14:creationId xmlns:p14="http://schemas.microsoft.com/office/powerpoint/2010/main" val="1081709012"/>
+        <p14:creationId xmlns:p14="http://schemas.microsoft.com/office/powerpoint/2010/main" val="3381454128"/>
       </p:ext>
     </p:extLst>
   </p:cSld>

</xml_diff>